<commit_message>
backend function for add Task page added
</commit_message>
<xml_diff>
--- a/object class structure.pptx
+++ b/object class structure.pptx
@@ -198,7 +198,7 @@
           <a:p>
             <a:fld id="{0FC489FD-CA9C-4A56-BC47-9A87331A9E89}" type="datetimeFigureOut">
               <a:rPr lang="de-DE" smtClean="0"/>
-              <a:t>27.04.2021</a:t>
+              <a:t>30.04.2021</a:t>
             </a:fld>
             <a:endParaRPr lang="de-DE"/>
           </a:p>
@@ -681,7 +681,7 @@
           <a:p>
             <a:fld id="{91074F90-1F61-4E2D-AF29-92FFAB80649E}" type="datetimeFigureOut">
               <a:rPr lang="de-DE" smtClean="0"/>
-              <a:t>27.04.2021</a:t>
+              <a:t>30.04.2021</a:t>
             </a:fld>
             <a:endParaRPr lang="de-DE"/>
           </a:p>
@@ -851,7 +851,7 @@
           <a:p>
             <a:fld id="{91074F90-1F61-4E2D-AF29-92FFAB80649E}" type="datetimeFigureOut">
               <a:rPr lang="de-DE" smtClean="0"/>
-              <a:t>27.04.2021</a:t>
+              <a:t>30.04.2021</a:t>
             </a:fld>
             <a:endParaRPr lang="de-DE"/>
           </a:p>
@@ -1031,7 +1031,7 @@
           <a:p>
             <a:fld id="{91074F90-1F61-4E2D-AF29-92FFAB80649E}" type="datetimeFigureOut">
               <a:rPr lang="de-DE" smtClean="0"/>
-              <a:t>27.04.2021</a:t>
+              <a:t>30.04.2021</a:t>
             </a:fld>
             <a:endParaRPr lang="de-DE"/>
           </a:p>
@@ -1201,7 +1201,7 @@
           <a:p>
             <a:fld id="{91074F90-1F61-4E2D-AF29-92FFAB80649E}" type="datetimeFigureOut">
               <a:rPr lang="de-DE" smtClean="0"/>
-              <a:t>27.04.2021</a:t>
+              <a:t>30.04.2021</a:t>
             </a:fld>
             <a:endParaRPr lang="de-DE"/>
           </a:p>
@@ -1447,7 +1447,7 @@
           <a:p>
             <a:fld id="{91074F90-1F61-4E2D-AF29-92FFAB80649E}" type="datetimeFigureOut">
               <a:rPr lang="de-DE" smtClean="0"/>
-              <a:t>27.04.2021</a:t>
+              <a:t>30.04.2021</a:t>
             </a:fld>
             <a:endParaRPr lang="de-DE"/>
           </a:p>
@@ -1679,7 +1679,7 @@
           <a:p>
             <a:fld id="{91074F90-1F61-4E2D-AF29-92FFAB80649E}" type="datetimeFigureOut">
               <a:rPr lang="de-DE" smtClean="0"/>
-              <a:t>27.04.2021</a:t>
+              <a:t>30.04.2021</a:t>
             </a:fld>
             <a:endParaRPr lang="de-DE"/>
           </a:p>
@@ -2046,7 +2046,7 @@
           <a:p>
             <a:fld id="{91074F90-1F61-4E2D-AF29-92FFAB80649E}" type="datetimeFigureOut">
               <a:rPr lang="de-DE" smtClean="0"/>
-              <a:t>27.04.2021</a:t>
+              <a:t>30.04.2021</a:t>
             </a:fld>
             <a:endParaRPr lang="de-DE"/>
           </a:p>
@@ -2164,7 +2164,7 @@
           <a:p>
             <a:fld id="{91074F90-1F61-4E2D-AF29-92FFAB80649E}" type="datetimeFigureOut">
               <a:rPr lang="de-DE" smtClean="0"/>
-              <a:t>27.04.2021</a:t>
+              <a:t>30.04.2021</a:t>
             </a:fld>
             <a:endParaRPr lang="de-DE"/>
           </a:p>
@@ -2259,7 +2259,7 @@
           <a:p>
             <a:fld id="{91074F90-1F61-4E2D-AF29-92FFAB80649E}" type="datetimeFigureOut">
               <a:rPr lang="de-DE" smtClean="0"/>
-              <a:t>27.04.2021</a:t>
+              <a:t>30.04.2021</a:t>
             </a:fld>
             <a:endParaRPr lang="de-DE"/>
           </a:p>
@@ -2536,7 +2536,7 @@
           <a:p>
             <a:fld id="{91074F90-1F61-4E2D-AF29-92FFAB80649E}" type="datetimeFigureOut">
               <a:rPr lang="de-DE" smtClean="0"/>
-              <a:t>27.04.2021</a:t>
+              <a:t>30.04.2021</a:t>
             </a:fld>
             <a:endParaRPr lang="de-DE"/>
           </a:p>
@@ -2789,7 +2789,7 @@
           <a:p>
             <a:fld id="{91074F90-1F61-4E2D-AF29-92FFAB80649E}" type="datetimeFigureOut">
               <a:rPr lang="de-DE" smtClean="0"/>
-              <a:t>27.04.2021</a:t>
+              <a:t>30.04.2021</a:t>
             </a:fld>
             <a:endParaRPr lang="de-DE"/>
           </a:p>
@@ -3002,7 +3002,7 @@
           <a:p>
             <a:fld id="{91074F90-1F61-4E2D-AF29-92FFAB80649E}" type="datetimeFigureOut">
               <a:rPr lang="de-DE" smtClean="0"/>
-              <a:t>27.04.2021</a:t>
+              <a:t>30.04.2021</a:t>
             </a:fld>
             <a:endParaRPr lang="de-DE"/>
           </a:p>
@@ -3407,6 +3407,96 @@
           <a:chExt cx="0" cy="0"/>
         </a:xfrm>
       </p:grpSpPr>
+      <p:sp>
+        <p:nvSpPr>
+          <p:cNvPr id="72" name="圆角矩形 71"/>
+          <p:cNvSpPr/>
+          <p:nvPr/>
+        </p:nvSpPr>
+        <p:spPr>
+          <a:xfrm>
+            <a:off x="2060694" y="1175517"/>
+            <a:ext cx="6836229" cy="790666"/>
+          </a:xfrm>
+          <a:prstGeom prst="roundRect">
+            <a:avLst/>
+          </a:prstGeom>
+          <a:solidFill>
+            <a:srgbClr val="92D050">
+              <a:alpha val="75000"/>
+            </a:srgbClr>
+          </a:solidFill>
+        </p:spPr>
+        <p:style>
+          <a:lnRef idx="2">
+            <a:schemeClr val="accent1">
+              <a:shade val="50000"/>
+            </a:schemeClr>
+          </a:lnRef>
+          <a:fillRef idx="1">
+            <a:schemeClr val="accent1"/>
+          </a:fillRef>
+          <a:effectRef idx="0">
+            <a:schemeClr val="accent1"/>
+          </a:effectRef>
+          <a:fontRef idx="minor">
+            <a:schemeClr val="lt1"/>
+          </a:fontRef>
+        </p:style>
+        <p:txBody>
+          <a:bodyPr rtlCol="0" anchor="ctr"/>
+          <a:lstStyle/>
+          <a:p>
+            <a:pPr algn="ctr"/>
+            <a:endParaRPr lang="de-DE"/>
+          </a:p>
+        </p:txBody>
+      </p:sp>
+      <p:sp>
+        <p:nvSpPr>
+          <p:cNvPr id="71" name="圆角矩形 70"/>
+          <p:cNvSpPr/>
+          <p:nvPr/>
+        </p:nvSpPr>
+        <p:spPr>
+          <a:xfrm>
+            <a:off x="2054691" y="3177986"/>
+            <a:ext cx="6836229" cy="813816"/>
+          </a:xfrm>
+          <a:prstGeom prst="roundRect">
+            <a:avLst/>
+          </a:prstGeom>
+          <a:solidFill>
+            <a:schemeClr val="accent1">
+              <a:alpha val="75000"/>
+            </a:schemeClr>
+          </a:solidFill>
+        </p:spPr>
+        <p:style>
+          <a:lnRef idx="2">
+            <a:schemeClr val="accent1">
+              <a:shade val="50000"/>
+            </a:schemeClr>
+          </a:lnRef>
+          <a:fillRef idx="1">
+            <a:schemeClr val="accent1"/>
+          </a:fillRef>
+          <a:effectRef idx="0">
+            <a:schemeClr val="accent1"/>
+          </a:effectRef>
+          <a:fontRef idx="minor">
+            <a:schemeClr val="lt1"/>
+          </a:fontRef>
+        </p:style>
+        <p:txBody>
+          <a:bodyPr rtlCol="0" anchor="ctr"/>
+          <a:lstStyle/>
+          <a:p>
+            <a:pPr algn="ctr"/>
+            <a:endParaRPr lang="de-DE"/>
+          </a:p>
+        </p:txBody>
+      </p:sp>
       <p:grpSp>
         <p:nvGrpSpPr>
           <p:cNvPr id="55" name="组合 54"/>
@@ -3415,61 +3505,12 @@
         </p:nvGrpSpPr>
         <p:grpSpPr>
           <a:xfrm>
-            <a:off x="2069534" y="1159810"/>
-            <a:ext cx="6836229" cy="808892"/>
-            <a:chOff x="286355" y="366154"/>
-            <a:chExt cx="6836229" cy="1149532"/>
+            <a:off x="2492989" y="1186266"/>
+            <a:ext cx="6397933" cy="552638"/>
+            <a:chOff x="709810" y="403751"/>
+            <a:chExt cx="6397933" cy="785364"/>
           </a:xfrm>
         </p:grpSpPr>
-        <p:sp>
-          <p:nvSpPr>
-            <p:cNvPr id="3" name="圆角矩形 2"/>
-            <p:cNvSpPr/>
-            <p:nvPr/>
-          </p:nvSpPr>
-          <p:spPr>
-            <a:xfrm>
-              <a:off x="286355" y="366154"/>
-              <a:ext cx="6836229" cy="1149532"/>
-            </a:xfrm>
-            <a:prstGeom prst="roundRect">
-              <a:avLst/>
-            </a:prstGeom>
-            <a:solidFill>
-              <a:schemeClr val="accent1">
-                <a:alpha val="75000"/>
-              </a:schemeClr>
-            </a:solidFill>
-          </p:spPr>
-          <p:style>
-            <a:lnRef idx="2">
-              <a:schemeClr val="accent1">
-                <a:shade val="50000"/>
-              </a:schemeClr>
-            </a:lnRef>
-            <a:fillRef idx="1">
-              <a:schemeClr val="accent1"/>
-            </a:fillRef>
-            <a:effectRef idx="0">
-              <a:schemeClr val="accent1"/>
-            </a:effectRef>
-            <a:fontRef idx="minor">
-              <a:schemeClr val="lt1"/>
-            </a:fontRef>
-          </p:style>
-          <p:txBody>
-            <a:bodyPr rtlCol="0" anchor="ctr"/>
-            <a:lstStyle/>
-            <a:p>
-              <a:pPr algn="ctr"/>
-              <a:r>
-                <a:rPr lang="en-US" dirty="0" smtClean="0"/>
-                <a:t>J</a:t>
-              </a:r>
-              <a:endParaRPr lang="de-DE" dirty="0"/>
-            </a:p>
-          </p:txBody>
-        </p:sp>
         <p:sp>
           <p:nvSpPr>
             <p:cNvPr id="5" name="矩形 4"/>
@@ -4095,57 +4136,12 @@
         </p:nvGrpSpPr>
         <p:grpSpPr>
           <a:xfrm>
-            <a:off x="2078210" y="3177428"/>
-            <a:ext cx="6861489" cy="790666"/>
-            <a:chOff x="286355" y="2542045"/>
-            <a:chExt cx="6861489" cy="1149533"/>
+            <a:off x="2501664" y="3274936"/>
+            <a:ext cx="6438035" cy="577215"/>
+            <a:chOff x="709809" y="2683810"/>
+            <a:chExt cx="6438035" cy="839201"/>
           </a:xfrm>
         </p:grpSpPr>
-        <p:sp>
-          <p:nvSpPr>
-            <p:cNvPr id="41" name="圆角矩形 40"/>
-            <p:cNvSpPr/>
-            <p:nvPr/>
-          </p:nvSpPr>
-          <p:spPr>
-            <a:xfrm>
-              <a:off x="286355" y="2542045"/>
-              <a:ext cx="6836229" cy="1149533"/>
-            </a:xfrm>
-            <a:prstGeom prst="roundRect">
-              <a:avLst/>
-            </a:prstGeom>
-            <a:solidFill>
-              <a:srgbClr val="92D050">
-                <a:alpha val="75000"/>
-              </a:srgbClr>
-            </a:solidFill>
-          </p:spPr>
-          <p:style>
-            <a:lnRef idx="2">
-              <a:schemeClr val="accent1">
-                <a:shade val="50000"/>
-              </a:schemeClr>
-            </a:lnRef>
-            <a:fillRef idx="1">
-              <a:schemeClr val="accent1"/>
-            </a:fillRef>
-            <a:effectRef idx="0">
-              <a:schemeClr val="accent1"/>
-            </a:effectRef>
-            <a:fontRef idx="minor">
-              <a:schemeClr val="lt1"/>
-            </a:fontRef>
-          </p:style>
-          <p:txBody>
-            <a:bodyPr rtlCol="0" anchor="ctr"/>
-            <a:lstStyle/>
-            <a:p>
-              <a:pPr algn="ctr"/>
-              <a:endParaRPr lang="de-DE"/>
-            </a:p>
-          </p:txBody>
-        </p:sp>
         <p:sp>
           <p:nvSpPr>
             <p:cNvPr id="34" name="矩形 33"/>
@@ -4184,15 +4180,7 @@
               <a:pPr algn="ctr"/>
               <a:r>
                 <a:rPr lang="en-US" sz="2400" dirty="0" smtClean="0"/>
-                <a:t>User</a:t>
-              </a:r>
-              <a:r>
-                <a:rPr lang="en-US" sz="2400" dirty="0" smtClean="0"/>
-                <a:t> </a:t>
-              </a:r>
-              <a:r>
-                <a:rPr lang="en-US" sz="2400" dirty="0" smtClean="0"/>
-                <a:t>object</a:t>
+                <a:t>User object</a:t>
               </a:r>
             </a:p>
           </p:txBody>
@@ -4235,15 +4223,7 @@
               <a:pPr algn="ctr"/>
               <a:r>
                 <a:rPr lang="en-US" sz="2400" dirty="0" smtClean="0"/>
-                <a:t>User</a:t>
-              </a:r>
-              <a:r>
-                <a:rPr lang="en-US" sz="2400" dirty="0" smtClean="0"/>
-                <a:t> </a:t>
-              </a:r>
-              <a:r>
-                <a:rPr lang="en-US" sz="2400" dirty="0" smtClean="0"/>
-                <a:t>object</a:t>
+                <a:t>User object</a:t>
               </a:r>
             </a:p>
           </p:txBody>
@@ -4508,8 +4488,8 @@
           </p:nvSpPr>
           <p:spPr>
             <a:xfrm>
-              <a:off x="724647" y="4335244"/>
-              <a:ext cx="1946367" cy="496389"/>
+              <a:off x="581209" y="4335244"/>
+              <a:ext cx="1460894" cy="496389"/>
             </a:xfrm>
             <a:prstGeom prst="rect">
               <a:avLst/>
@@ -4555,8 +4535,8 @@
           </p:nvSpPr>
           <p:spPr>
             <a:xfrm>
-              <a:off x="2746126" y="4335244"/>
-              <a:ext cx="1946367" cy="496389"/>
+              <a:off x="2159931" y="4335244"/>
+              <a:ext cx="1460895" cy="496389"/>
             </a:xfrm>
             <a:prstGeom prst="rect">
               <a:avLst/>
@@ -4602,8 +4582,8 @@
           </p:nvSpPr>
           <p:spPr>
             <a:xfrm>
-              <a:off x="4767606" y="4339594"/>
-              <a:ext cx="1946367" cy="496389"/>
+              <a:off x="3726950" y="4335244"/>
+              <a:ext cx="1595780" cy="496389"/>
             </a:xfrm>
             <a:prstGeom prst="rect">
               <a:avLst/>
@@ -4820,6 +4800,120 @@
           </a:p>
         </p:txBody>
       </p:sp>
+      <p:sp>
+        <p:nvSpPr>
+          <p:cNvPr id="68" name="圆角矩形 67"/>
+          <p:cNvSpPr/>
+          <p:nvPr/>
+        </p:nvSpPr>
+        <p:spPr>
+          <a:xfrm>
+            <a:off x="10208128" y="939666"/>
+            <a:ext cx="1438223" cy="376544"/>
+          </a:xfrm>
+          <a:prstGeom prst="roundRect">
+            <a:avLst/>
+          </a:prstGeom>
+          <a:solidFill>
+            <a:srgbClr val="92D050">
+              <a:alpha val="75000"/>
+            </a:srgbClr>
+          </a:solidFill>
+        </p:spPr>
+        <p:style>
+          <a:lnRef idx="2">
+            <a:schemeClr val="accent1">
+              <a:shade val="50000"/>
+            </a:schemeClr>
+          </a:lnRef>
+          <a:fillRef idx="1">
+            <a:schemeClr val="accent1"/>
+          </a:fillRef>
+          <a:effectRef idx="0">
+            <a:schemeClr val="accent1"/>
+          </a:effectRef>
+          <a:fontRef idx="minor">
+            <a:schemeClr val="lt1"/>
+          </a:fontRef>
+        </p:style>
+        <p:txBody>
+          <a:bodyPr rtlCol="0" anchor="ctr"/>
+          <a:lstStyle/>
+          <a:p>
+            <a:pPr algn="ctr"/>
+            <a:r>
+              <a:rPr lang="en-US" sz="1400" dirty="0" err="1" smtClean="0"/>
+              <a:t>Statische</a:t>
+            </a:r>
+            <a:r>
+              <a:rPr lang="en-US" sz="1400" dirty="0" smtClean="0"/>
+              <a:t> </a:t>
+            </a:r>
+            <a:r>
+              <a:rPr lang="en-US" sz="1400" dirty="0" err="1" smtClean="0"/>
+              <a:t>Daten</a:t>
+            </a:r>
+            <a:endParaRPr lang="de-DE" sz="1400" dirty="0"/>
+          </a:p>
+        </p:txBody>
+      </p:sp>
+      <p:sp>
+        <p:nvSpPr>
+          <p:cNvPr id="69" name="圆角矩形 68"/>
+          <p:cNvSpPr/>
+          <p:nvPr/>
+        </p:nvSpPr>
+        <p:spPr>
+          <a:xfrm>
+            <a:off x="10208127" y="1587694"/>
+            <a:ext cx="1438223" cy="379621"/>
+          </a:xfrm>
+          <a:prstGeom prst="roundRect">
+            <a:avLst/>
+          </a:prstGeom>
+          <a:solidFill>
+            <a:schemeClr val="accent1">
+              <a:alpha val="75000"/>
+            </a:schemeClr>
+          </a:solidFill>
+        </p:spPr>
+        <p:style>
+          <a:lnRef idx="2">
+            <a:schemeClr val="accent1">
+              <a:shade val="50000"/>
+            </a:schemeClr>
+          </a:lnRef>
+          <a:fillRef idx="1">
+            <a:schemeClr val="accent1"/>
+          </a:fillRef>
+          <a:effectRef idx="0">
+            <a:schemeClr val="accent1"/>
+          </a:effectRef>
+          <a:fontRef idx="minor">
+            <a:schemeClr val="lt1"/>
+          </a:fontRef>
+        </p:style>
+        <p:txBody>
+          <a:bodyPr rtlCol="0" anchor="ctr"/>
+          <a:lstStyle/>
+          <a:p>
+            <a:pPr algn="ctr"/>
+            <a:r>
+              <a:rPr lang="en-US" sz="1200" dirty="0" err="1" smtClean="0"/>
+              <a:t>Dynamische</a:t>
+            </a:r>
+            <a:r>
+              <a:rPr lang="en-US" sz="1200" dirty="0" smtClean="0"/>
+              <a:t> </a:t>
+            </a:r>
+            <a:r>
+              <a:rPr lang="en-US" sz="1200" dirty="0" err="1" smtClean="0"/>
+              <a:t>Daten</a:t>
+            </a:r>
+            <a:endParaRPr lang="de-DE" sz="1200" dirty="0"/>
+          </a:p>
+        </p:txBody>
+      </p:sp>
       <p:grpSp>
         <p:nvGrpSpPr>
           <p:cNvPr id="60" name="组合 59"/>
@@ -4828,10 +4922,10 @@
         </p:nvGrpSpPr>
         <p:grpSpPr>
           <a:xfrm>
-            <a:off x="2103470" y="4167961"/>
-            <a:ext cx="6836229" cy="813816"/>
-            <a:chOff x="286355" y="366154"/>
-            <a:chExt cx="6836229" cy="1149532"/>
+            <a:off x="2019830" y="4316018"/>
+            <a:ext cx="7004833" cy="790666"/>
+            <a:chOff x="192862" y="2542045"/>
+            <a:chExt cx="7004833" cy="1149533"/>
           </a:xfrm>
         </p:grpSpPr>
         <p:sp>
@@ -4842,16 +4936,16 @@
           </p:nvSpPr>
           <p:spPr>
             <a:xfrm>
-              <a:off x="286355" y="366154"/>
-              <a:ext cx="6836229" cy="1149532"/>
+              <a:off x="192862" y="2542045"/>
+              <a:ext cx="6871090" cy="1149533"/>
             </a:xfrm>
             <a:prstGeom prst="roundRect">
               <a:avLst/>
             </a:prstGeom>
             <a:solidFill>
-              <a:schemeClr val="accent1">
+              <a:srgbClr val="92D050">
                 <a:alpha val="75000"/>
-              </a:schemeClr>
+              </a:srgbClr>
             </a:solidFill>
           </p:spPr>
           <p:style>
@@ -4875,11 +4969,7 @@
             <a:lstStyle/>
             <a:p>
               <a:pPr algn="ctr"/>
-              <a:r>
-                <a:rPr lang="en-US" dirty="0" smtClean="0"/>
-                <a:t>J</a:t>
-              </a:r>
-              <a:endParaRPr lang="de-DE" dirty="0"/>
+              <a:endParaRPr lang="de-DE"/>
             </a:p>
           </p:txBody>
         </p:sp>
@@ -4891,8 +4981,8 @@
           </p:nvSpPr>
           <p:spPr>
             <a:xfrm>
-              <a:off x="709810" y="692726"/>
-              <a:ext cx="1946367" cy="496389"/>
+              <a:off x="311516" y="3026622"/>
+              <a:ext cx="1144648" cy="496389"/>
             </a:xfrm>
             <a:prstGeom prst="rect">
               <a:avLst/>
@@ -4900,15 +4990,15 @@
           </p:spPr>
           <p:style>
             <a:lnRef idx="2">
-              <a:schemeClr val="accent2">
+              <a:schemeClr val="accent3">
                 <a:shade val="50000"/>
               </a:schemeClr>
             </a:lnRef>
             <a:fillRef idx="1">
-              <a:schemeClr val="accent2"/>
+              <a:schemeClr val="accent3"/>
             </a:fillRef>
             <a:effectRef idx="0">
-              <a:schemeClr val="accent2"/>
+              <a:schemeClr val="accent3"/>
             </a:effectRef>
             <a:fontRef idx="minor">
               <a:schemeClr val="lt1"/>
@@ -4921,12 +5011,9 @@
               <a:pPr algn="ctr"/>
               <a:r>
                 <a:rPr lang="en-US" sz="2400" dirty="0" smtClean="0"/>
-                <a:t>Log </a:t>
+                <a:t>TODO</a:t>
               </a:r>
-              <a:r>
-                <a:rPr lang="en-US" sz="2400" dirty="0" smtClean="0"/>
-                <a:t>object</a:t>
-              </a:r>
+              <a:endParaRPr lang="en-US" sz="2400" dirty="0" smtClean="0"/>
             </a:p>
           </p:txBody>
         </p:sp>
@@ -4938,7 +5025,7 @@
           </p:nvSpPr>
           <p:spPr>
             <a:xfrm>
-              <a:off x="2731288" y="692726"/>
+              <a:off x="1574818" y="3026622"/>
               <a:ext cx="1946367" cy="496389"/>
             </a:xfrm>
             <a:prstGeom prst="rect">
@@ -4947,15 +5034,15 @@
           </p:spPr>
           <p:style>
             <a:lnRef idx="2">
-              <a:schemeClr val="accent2">
+              <a:schemeClr val="accent3">
                 <a:shade val="50000"/>
               </a:schemeClr>
             </a:lnRef>
             <a:fillRef idx="1">
-              <a:schemeClr val="accent2"/>
+              <a:schemeClr val="accent3"/>
             </a:fillRef>
             <a:effectRef idx="0">
-              <a:schemeClr val="accent2"/>
+              <a:schemeClr val="accent3"/>
             </a:effectRef>
             <a:fontRef idx="minor">
               <a:schemeClr val="lt1"/>
@@ -4968,132 +5055,9 @@
               <a:pPr algn="ctr"/>
               <a:r>
                 <a:rPr lang="en-US" sz="2400" dirty="0" smtClean="0"/>
-                <a:t>Log </a:t>
+                <a:t>IN PROGRESS</a:t>
               </a:r>
-              <a:r>
-                <a:rPr lang="en-US" sz="2400" dirty="0" smtClean="0"/>
-                <a:t>object</a:t>
-              </a:r>
-            </a:p>
-          </p:txBody>
-        </p:sp>
-        <p:sp>
-          <p:nvSpPr>
-            <p:cNvPr id="64" name="椭圆 63"/>
-            <p:cNvSpPr/>
-            <p:nvPr/>
-          </p:nvSpPr>
-          <p:spPr>
-            <a:xfrm>
-              <a:off x="4932218" y="848556"/>
-              <a:ext cx="184728" cy="184728"/>
-            </a:xfrm>
-            <a:prstGeom prst="ellipse">
-              <a:avLst/>
-            </a:prstGeom>
-          </p:spPr>
-          <p:style>
-            <a:lnRef idx="2">
-              <a:schemeClr val="accent2">
-                <a:shade val="50000"/>
-              </a:schemeClr>
-            </a:lnRef>
-            <a:fillRef idx="1">
-              <a:schemeClr val="accent2"/>
-            </a:fillRef>
-            <a:effectRef idx="0">
-              <a:schemeClr val="accent2"/>
-            </a:effectRef>
-            <a:fontRef idx="minor">
-              <a:schemeClr val="lt1"/>
-            </a:fontRef>
-          </p:style>
-          <p:txBody>
-            <a:bodyPr rtlCol="0" anchor="ctr"/>
-            <a:lstStyle/>
-            <a:p>
-              <a:pPr algn="ctr"/>
-              <a:endParaRPr lang="de-DE" sz="2400" dirty="0"/>
-            </a:p>
-          </p:txBody>
-        </p:sp>
-        <p:sp>
-          <p:nvSpPr>
-            <p:cNvPr id="65" name="椭圆 64"/>
-            <p:cNvSpPr/>
-            <p:nvPr/>
-          </p:nvSpPr>
-          <p:spPr>
-            <a:xfrm>
-              <a:off x="5186781" y="848556"/>
-              <a:ext cx="184728" cy="184728"/>
-            </a:xfrm>
-            <a:prstGeom prst="ellipse">
-              <a:avLst/>
-            </a:prstGeom>
-          </p:spPr>
-          <p:style>
-            <a:lnRef idx="2">
-              <a:schemeClr val="accent2">
-                <a:shade val="50000"/>
-              </a:schemeClr>
-            </a:lnRef>
-            <a:fillRef idx="1">
-              <a:schemeClr val="accent2"/>
-            </a:fillRef>
-            <a:effectRef idx="0">
-              <a:schemeClr val="accent2"/>
-            </a:effectRef>
-            <a:fontRef idx="minor">
-              <a:schemeClr val="lt1"/>
-            </a:fontRef>
-          </p:style>
-          <p:txBody>
-            <a:bodyPr rtlCol="0" anchor="ctr"/>
-            <a:lstStyle/>
-            <a:p>
-              <a:pPr algn="ctr"/>
-              <a:endParaRPr lang="de-DE" sz="2400" dirty="0"/>
-            </a:p>
-          </p:txBody>
-        </p:sp>
-        <p:sp>
-          <p:nvSpPr>
-            <p:cNvPr id="66" name="椭圆 65"/>
-            <p:cNvSpPr/>
-            <p:nvPr/>
-          </p:nvSpPr>
-          <p:spPr>
-            <a:xfrm>
-              <a:off x="5441344" y="855019"/>
-              <a:ext cx="184728" cy="184728"/>
-            </a:xfrm>
-            <a:prstGeom prst="ellipse">
-              <a:avLst/>
-            </a:prstGeom>
-          </p:spPr>
-          <p:style>
-            <a:lnRef idx="2">
-              <a:schemeClr val="accent2">
-                <a:shade val="50000"/>
-              </a:schemeClr>
-            </a:lnRef>
-            <a:fillRef idx="1">
-              <a:schemeClr val="accent2"/>
-            </a:fillRef>
-            <a:effectRef idx="0">
-              <a:schemeClr val="accent2"/>
-            </a:effectRef>
-            <a:fontRef idx="minor">
-              <a:schemeClr val="lt1"/>
-            </a:fontRef>
-          </p:style>
-          <p:txBody>
-            <a:bodyPr rtlCol="0" anchor="ctr"/>
-            <a:lstStyle/>
-            <a:p>
-              <a:pPr algn="ctr"/>
-              <a:endParaRPr lang="de-DE" sz="2400" dirty="0"/>
+              <a:endParaRPr lang="en-US" sz="2400" dirty="0" smtClean="0"/>
             </a:p>
           </p:txBody>
         </p:sp>
@@ -5105,8 +5069,8 @@
           </p:nvSpPr>
           <p:spPr>
             <a:xfrm>
-              <a:off x="4677654" y="403751"/>
-              <a:ext cx="2443874" cy="521689"/>
+              <a:off x="4239321" y="2582256"/>
+              <a:ext cx="2958374" cy="536964"/>
             </a:xfrm>
             <a:prstGeom prst="rect">
               <a:avLst/>
@@ -5137,7 +5101,17 @@
                     </a:schemeClr>
                   </a:solidFill>
                 </a:rPr>
-                <a:t> Array: “</a:t>
+                <a:t> Array: </a:t>
+              </a:r>
+              <a:r>
+                <a:rPr lang="en-US" dirty="0" smtClean="0">
+                  <a:solidFill>
+                    <a:schemeClr val="accent1">
+                      <a:lumMod val="75000"/>
+                    </a:schemeClr>
+                  </a:solidFill>
+                </a:rPr>
+                <a:t>“</a:t>
               </a:r>
               <a:r>
                 <a:rPr lang="en-US" dirty="0" err="1" smtClean="0">
@@ -5147,7 +5121,17 @@
                     </a:schemeClr>
                   </a:solidFill>
                 </a:rPr>
-                <a:t>logObjects</a:t>
+                <a:t>category</a:t>
+              </a:r>
+              <a:r>
+                <a:rPr lang="en-US" dirty="0" err="1" smtClean="0">
+                  <a:solidFill>
+                    <a:schemeClr val="accent1">
+                      <a:lumMod val="75000"/>
+                    </a:schemeClr>
+                  </a:solidFill>
+                </a:rPr>
+                <a:t>Objects</a:t>
               </a:r>
               <a:r>
                 <a:rPr lang="en-US" dirty="0" smtClean="0">
@@ -5172,35 +5156,30 @@
       </p:grpSp>
       <p:sp>
         <p:nvSpPr>
-          <p:cNvPr id="68" name="圆角矩形 67"/>
+          <p:cNvPr id="73" name="矩形 72"/>
           <p:cNvSpPr/>
           <p:nvPr/>
         </p:nvSpPr>
         <p:spPr>
           <a:xfrm>
-            <a:off x="10208128" y="939666"/>
-            <a:ext cx="1438223" cy="376544"/>
+            <a:off x="5471560" y="4647799"/>
+            <a:ext cx="1338543" cy="341424"/>
           </a:xfrm>
-          <a:prstGeom prst="roundRect">
+          <a:prstGeom prst="rect">
             <a:avLst/>
           </a:prstGeom>
-          <a:solidFill>
-            <a:srgbClr val="92D050">
-              <a:alpha val="75000"/>
-            </a:srgbClr>
-          </a:solidFill>
         </p:spPr>
         <p:style>
           <a:lnRef idx="2">
-            <a:schemeClr val="accent1">
+            <a:schemeClr val="accent3">
               <a:shade val="50000"/>
             </a:schemeClr>
           </a:lnRef>
           <a:fillRef idx="1">
-            <a:schemeClr val="accent1"/>
+            <a:schemeClr val="accent3"/>
           </a:fillRef>
           <a:effectRef idx="0">
-            <a:schemeClr val="accent1"/>
+            <a:schemeClr val="accent3"/>
           </a:effectRef>
           <a:fontRef idx="minor">
             <a:schemeClr val="lt1"/>
@@ -5212,52 +5191,39 @@
           <a:p>
             <a:pPr algn="ctr"/>
             <a:r>
-              <a:rPr lang="en-US" sz="1400" dirty="0" err="1" smtClean="0"/>
-              <a:t>Statische</a:t>
-            </a:r>
-            <a:r>
-              <a:rPr lang="en-US" sz="1400" dirty="0" smtClean="0"/>
-              <a:t> </a:t>
-            </a:r>
-            <a:r>
-              <a:rPr lang="en-US" sz="1400" dirty="0" err="1" smtClean="0"/>
-              <a:t>Daten</a:t>
-            </a:r>
-            <a:endParaRPr lang="de-DE" sz="1400" dirty="0"/>
-          </a:p>
-        </p:txBody>
-      </p:sp>
-      <p:sp>
-        <p:nvSpPr>
-          <p:cNvPr id="69" name="圆角矩形 68"/>
+              <a:rPr lang="en-US" sz="2400" dirty="0" smtClean="0"/>
+              <a:t>TESTING</a:t>
+            </a:r>
+            <a:endParaRPr lang="en-US" sz="2400" dirty="0" smtClean="0"/>
+          </a:p>
+        </p:txBody>
+      </p:sp>
+      <p:sp>
+        <p:nvSpPr>
+          <p:cNvPr id="74" name="矩形 73"/>
           <p:cNvSpPr/>
           <p:nvPr/>
         </p:nvSpPr>
         <p:spPr>
           <a:xfrm>
-            <a:off x="10208127" y="1587694"/>
-            <a:ext cx="1438223" cy="379621"/>
+            <a:off x="6915143" y="4647799"/>
+            <a:ext cx="1338543" cy="341424"/>
           </a:xfrm>
-          <a:prstGeom prst="roundRect">
+          <a:prstGeom prst="rect">
             <a:avLst/>
           </a:prstGeom>
-          <a:solidFill>
-            <a:schemeClr val="accent1">
-              <a:alpha val="75000"/>
-            </a:schemeClr>
-          </a:solidFill>
         </p:spPr>
         <p:style>
           <a:lnRef idx="2">
-            <a:schemeClr val="accent1">
+            <a:schemeClr val="accent3">
               <a:shade val="50000"/>
             </a:schemeClr>
           </a:lnRef>
           <a:fillRef idx="1">
-            <a:schemeClr val="accent1"/>
+            <a:schemeClr val="accent3"/>
           </a:fillRef>
           <a:effectRef idx="0">
-            <a:schemeClr val="accent1"/>
+            <a:schemeClr val="accent3"/>
           </a:effectRef>
           <a:fontRef idx="minor">
             <a:schemeClr val="lt1"/>
@@ -5269,18 +5235,10 @@
           <a:p>
             <a:pPr algn="ctr"/>
             <a:r>
-              <a:rPr lang="en-US" sz="1200" dirty="0" err="1" smtClean="0"/>
-              <a:t>Dynamische</a:t>
-            </a:r>
-            <a:r>
-              <a:rPr lang="en-US" sz="1200" dirty="0" smtClean="0"/>
-              <a:t> </a:t>
-            </a:r>
-            <a:r>
-              <a:rPr lang="en-US" sz="1200" dirty="0" err="1" smtClean="0"/>
-              <a:t>Daten</a:t>
-            </a:r>
-            <a:endParaRPr lang="de-DE" sz="1200" dirty="0"/>
+              <a:rPr lang="en-US" sz="2400" dirty="0" smtClean="0"/>
+              <a:t>DONE</a:t>
+            </a:r>
+            <a:endParaRPr lang="en-US" sz="2400" dirty="0" smtClean="0"/>
           </a:p>
         </p:txBody>
       </p:sp>

</xml_diff>